<commit_message>
update temperature prob boundary conditions
</commit_message>
<xml_diff>
--- a/LectureMaterials/09-23-Thursday/cs111-01-temperature.pptx
+++ b/LectureMaterials/09-23-Thursday/cs111-01-temperature.pptx
@@ -561,14 +561,14 @@
           </a:ln>
           <a:extLst>
             <a:ext uri="{909E8E84-426E-40dd-AFC4-6F175D3DCCD1}">
-              <a14:hiddenFill xmlns:a14="http://schemas.microsoft.com/office/drawing/2010/main" xmlns="">
+              <a14:hiddenFill xmlns="" xmlns:a14="http://schemas.microsoft.com/office/drawing/2010/main">
                 <a:solidFill>
                   <a:srgbClr val="FFFFFF"/>
                 </a:solidFill>
               </a14:hiddenFill>
             </a:ext>
             <a:ext uri="{FAA26D3D-D897-4be2-8F04-BA451C77F1D7}">
-              <ma14:placeholderFlag xmlns:ma14="http://schemas.microsoft.com/office/mac/drawingml/2011/main" xmlns="" val="1"/>
+              <ma14:placeholderFlag xmlns="" xmlns:ma14="http://schemas.microsoft.com/office/mac/drawingml/2011/main" val="1"/>
             </a:ext>
           </a:extLst>
         </p:spPr>
@@ -2600,14 +2600,14 @@
           </a:ln>
           <a:extLst>
             <a:ext uri="{909E8E84-426E-40dd-AFC4-6F175D3DCCD1}">
-              <a14:hiddenFill xmlns:a14="http://schemas.microsoft.com/office/drawing/2010/main" xmlns="">
+              <a14:hiddenFill xmlns="" xmlns:a14="http://schemas.microsoft.com/office/drawing/2010/main">
                 <a:solidFill>
                   <a:srgbClr val="FFFFFF"/>
                 </a:solidFill>
               </a14:hiddenFill>
             </a:ext>
             <a:ext uri="{91240B29-F687-4f45-9708-019B960494DF}">
-              <a14:hiddenLine xmlns:a14="http://schemas.microsoft.com/office/drawing/2010/main" xmlns="" w="12700">
+              <a14:hiddenLine xmlns="" xmlns:a14="http://schemas.microsoft.com/office/drawing/2010/main" w="12700">
                 <a:solidFill>
                   <a:srgbClr val="000000"/>
                 </a:solidFill>
@@ -2617,7 +2617,7 @@
               </a14:hiddenLine>
             </a:ext>
             <a:ext uri="{FAA26D3D-D897-4be2-8F04-BA451C77F1D7}">
-              <ma14:placeholderFlag xmlns:ma14="http://schemas.microsoft.com/office/mac/drawingml/2011/main" xmlns="" val="1"/>
+              <ma14:placeholderFlag xmlns="" xmlns:ma14="http://schemas.microsoft.com/office/mac/drawingml/2011/main" val="1"/>
             </a:ext>
           </a:extLst>
         </p:spPr>
@@ -3253,7 +3253,7 @@
                 </a:solidFill>
                 <a:latin typeface="Arial" charset="0"/>
               </a:rPr>
-              <a:t>Wall temperature is 0°, except for a radiator at 100°</a:t>
+              <a:t>Wall temperature is 32°except for a radiator at 212°</a:t>
             </a:r>
           </a:p>
           <a:p>
@@ -3438,7 +3438,7 @@
                 </a:solidFill>
                 <a:latin typeface="Arial" charset="0"/>
               </a:rPr>
-              <a:t>Wall temperature is 0°, except for a radiator at 100°</a:t>
+              <a:t>Wall temperature is 32°except for a radiator at 212°</a:t>
             </a:r>
           </a:p>
           <a:p>
@@ -3652,14 +3652,14 @@
           </a:ln>
           <a:extLst>
             <a:ext uri="{909E8E84-426E-40dd-AFC4-6F175D3DCCD1}">
-              <a14:hiddenFill xmlns:a14="http://schemas.microsoft.com/office/drawing/2010/main" xmlns="">
+              <a14:hiddenFill xmlns="" xmlns:a14="http://schemas.microsoft.com/office/drawing/2010/main">
                 <a:solidFill>
                   <a:srgbClr val="FFFFFF"/>
                 </a:solidFill>
               </a14:hiddenFill>
             </a:ext>
             <a:ext uri="{91240B29-F687-4f45-9708-019B960494DF}">
-              <a14:hiddenLine xmlns:a14="http://schemas.microsoft.com/office/drawing/2010/main" xmlns="" w="9525">
+              <a14:hiddenLine xmlns="" xmlns:a14="http://schemas.microsoft.com/office/drawing/2010/main" w="9525">
                 <a:solidFill>
                   <a:srgbClr val="000000"/>
                 </a:solidFill>
@@ -3693,14 +3693,14 @@
           </a:ln>
           <a:extLst>
             <a:ext uri="{909E8E84-426E-40dd-AFC4-6F175D3DCCD1}">
-              <a14:hiddenFill xmlns:a14="http://schemas.microsoft.com/office/drawing/2010/main" xmlns="">
+              <a14:hiddenFill xmlns="" xmlns:a14="http://schemas.microsoft.com/office/drawing/2010/main">
                 <a:solidFill>
                   <a:srgbClr val="FFFFFF"/>
                 </a:solidFill>
               </a14:hiddenFill>
             </a:ext>
             <a:ext uri="{91240B29-F687-4f45-9708-019B960494DF}">
-              <a14:hiddenLine xmlns:a14="http://schemas.microsoft.com/office/drawing/2010/main" xmlns="" w="9525">
+              <a14:hiddenLine xmlns="" xmlns:a14="http://schemas.microsoft.com/office/drawing/2010/main" w="9525">
                 <a:solidFill>
                   <a:srgbClr val="000000"/>
                 </a:solidFill>
@@ -3858,14 +3858,14 @@
           </a:ln>
           <a:extLst>
             <a:ext uri="{909E8E84-426E-40dd-AFC4-6F175D3DCCD1}">
-              <a14:hiddenFill xmlns:a14="http://schemas.microsoft.com/office/drawing/2010/main" xmlns="">
+              <a14:hiddenFill xmlns="" xmlns:a14="http://schemas.microsoft.com/office/drawing/2010/main">
                 <a:solidFill>
                   <a:srgbClr val="FFFFFF"/>
                 </a:solidFill>
               </a14:hiddenFill>
             </a:ext>
             <a:ext uri="{91240B29-F687-4f45-9708-019B960494DF}">
-              <a14:hiddenLine xmlns:a14="http://schemas.microsoft.com/office/drawing/2010/main" xmlns="" w="12700">
+              <a14:hiddenLine xmlns="" xmlns:a14="http://schemas.microsoft.com/office/drawing/2010/main" w="12700">
                 <a:solidFill>
                   <a:srgbClr val="000000"/>
                 </a:solidFill>
@@ -4426,7 +4426,7 @@
                 </a:ln>
                 <a:extLst>
                   <a:ext uri="{909E8E84-426E-40dd-AFC4-6F175D3DCCD1}">
-                    <a14:hiddenFill xmlns:a14="http://schemas.microsoft.com/office/drawing/2010/main" xmlns="">
+                    <a14:hiddenFill xmlns="" xmlns:a14="http://schemas.microsoft.com/office/drawing/2010/main">
                       <a:noFill/>
                     </a14:hiddenFill>
                   </a:ext>
@@ -4472,7 +4472,7 @@
                 </a:ln>
                 <a:extLst>
                   <a:ext uri="{909E8E84-426E-40dd-AFC4-6F175D3DCCD1}">
-                    <a14:hiddenFill xmlns:a14="http://schemas.microsoft.com/office/drawing/2010/main" xmlns="">
+                    <a14:hiddenFill xmlns="" xmlns:a14="http://schemas.microsoft.com/office/drawing/2010/main">
                       <a:noFill/>
                     </a14:hiddenFill>
                   </a:ext>
@@ -4518,7 +4518,7 @@
                 </a:ln>
                 <a:extLst>
                   <a:ext uri="{909E8E84-426E-40dd-AFC4-6F175D3DCCD1}">
-                    <a14:hiddenFill xmlns:a14="http://schemas.microsoft.com/office/drawing/2010/main" xmlns="">
+                    <a14:hiddenFill xmlns="" xmlns:a14="http://schemas.microsoft.com/office/drawing/2010/main">
                       <a:noFill/>
                     </a14:hiddenFill>
                   </a:ext>
@@ -4564,7 +4564,7 @@
                 </a:ln>
                 <a:extLst>
                   <a:ext uri="{909E8E84-426E-40dd-AFC4-6F175D3DCCD1}">
-                    <a14:hiddenFill xmlns:a14="http://schemas.microsoft.com/office/drawing/2010/main" xmlns="">
+                    <a14:hiddenFill xmlns="" xmlns:a14="http://schemas.microsoft.com/office/drawing/2010/main">
                       <a:noFill/>
                     </a14:hiddenFill>
                   </a:ext>
@@ -4610,7 +4610,7 @@
                 </a:ln>
                 <a:extLst>
                   <a:ext uri="{909E8E84-426E-40dd-AFC4-6F175D3DCCD1}">
-                    <a14:hiddenFill xmlns:a14="http://schemas.microsoft.com/office/drawing/2010/main" xmlns="">
+                    <a14:hiddenFill xmlns="" xmlns:a14="http://schemas.microsoft.com/office/drawing/2010/main">
                       <a:noFill/>
                     </a14:hiddenFill>
                   </a:ext>
@@ -4673,7 +4673,7 @@
                 </a:ln>
                 <a:extLst>
                   <a:ext uri="{909E8E84-426E-40dd-AFC4-6F175D3DCCD1}">
-                    <a14:hiddenFill xmlns:a14="http://schemas.microsoft.com/office/drawing/2010/main" xmlns="">
+                    <a14:hiddenFill xmlns="" xmlns:a14="http://schemas.microsoft.com/office/drawing/2010/main">
                       <a:noFill/>
                     </a14:hiddenFill>
                   </a:ext>
@@ -4719,7 +4719,7 @@
                 </a:ln>
                 <a:extLst>
                   <a:ext uri="{909E8E84-426E-40dd-AFC4-6F175D3DCCD1}">
-                    <a14:hiddenFill xmlns:a14="http://schemas.microsoft.com/office/drawing/2010/main" xmlns="">
+                    <a14:hiddenFill xmlns="" xmlns:a14="http://schemas.microsoft.com/office/drawing/2010/main">
                       <a:noFill/>
                     </a14:hiddenFill>
                   </a:ext>
@@ -4765,7 +4765,7 @@
                 </a:ln>
                 <a:extLst>
                   <a:ext uri="{909E8E84-426E-40dd-AFC4-6F175D3DCCD1}">
-                    <a14:hiddenFill xmlns:a14="http://schemas.microsoft.com/office/drawing/2010/main" xmlns="">
+                    <a14:hiddenFill xmlns="" xmlns:a14="http://schemas.microsoft.com/office/drawing/2010/main">
                       <a:noFill/>
                     </a14:hiddenFill>
                   </a:ext>
@@ -4811,7 +4811,7 @@
                 </a:ln>
                 <a:extLst>
                   <a:ext uri="{909E8E84-426E-40dd-AFC4-6F175D3DCCD1}">
-                    <a14:hiddenFill xmlns:a14="http://schemas.microsoft.com/office/drawing/2010/main" xmlns="">
+                    <a14:hiddenFill xmlns="" xmlns:a14="http://schemas.microsoft.com/office/drawing/2010/main">
                       <a:noFill/>
                     </a14:hiddenFill>
                   </a:ext>
@@ -4857,7 +4857,7 @@
                 </a:ln>
                 <a:extLst>
                   <a:ext uri="{909E8E84-426E-40dd-AFC4-6F175D3DCCD1}">
-                    <a14:hiddenFill xmlns:a14="http://schemas.microsoft.com/office/drawing/2010/main" xmlns="">
+                    <a14:hiddenFill xmlns="" xmlns:a14="http://schemas.microsoft.com/office/drawing/2010/main">
                       <a:noFill/>
                     </a14:hiddenFill>
                   </a:ext>
@@ -4900,14 +4900,14 @@
             </a:ln>
             <a:extLst>
               <a:ext uri="{909E8E84-426E-40dd-AFC4-6F175D3DCCD1}">
-                <a14:hiddenFill xmlns:a14="http://schemas.microsoft.com/office/drawing/2010/main" xmlns="">
+                <a14:hiddenFill xmlns="" xmlns:a14="http://schemas.microsoft.com/office/drawing/2010/main">
                   <a:solidFill>
                     <a:srgbClr val="FFFFFF"/>
                   </a:solidFill>
                 </a14:hiddenFill>
               </a:ext>
               <a:ext uri="{91240B29-F687-4f45-9708-019B960494DF}">
-                <a14:hiddenLine xmlns:a14="http://schemas.microsoft.com/office/drawing/2010/main" xmlns="" w="12700">
+                <a14:hiddenLine xmlns="" xmlns:a14="http://schemas.microsoft.com/office/drawing/2010/main" w="12700">
                   <a:solidFill>
                     <a:srgbClr val="000000"/>
                   </a:solidFill>
@@ -5080,7 +5080,7 @@
             </a:ln>
             <a:extLst>
               <a:ext uri="{909E8E84-426E-40dd-AFC4-6F175D3DCCD1}">
-                <a14:hiddenFill xmlns:a14="http://schemas.microsoft.com/office/drawing/2010/main" xmlns="">
+                <a14:hiddenFill xmlns="" xmlns:a14="http://schemas.microsoft.com/office/drawing/2010/main">
                   <a:noFill/>
                 </a14:hiddenFill>
               </a:ext>
@@ -5569,7 +5569,7 @@
                 </a:ln>
                 <a:extLst>
                   <a:ext uri="{909E8E84-426E-40dd-AFC4-6F175D3DCCD1}">
-                    <a14:hiddenFill xmlns:a14="http://schemas.microsoft.com/office/drawing/2010/main" xmlns="">
+                    <a14:hiddenFill xmlns="" xmlns:a14="http://schemas.microsoft.com/office/drawing/2010/main">
                       <a:noFill/>
                     </a14:hiddenFill>
                   </a:ext>
@@ -5610,7 +5610,7 @@
                 </a:ln>
                 <a:extLst>
                   <a:ext uri="{909E8E84-426E-40dd-AFC4-6F175D3DCCD1}">
-                    <a14:hiddenFill xmlns:a14="http://schemas.microsoft.com/office/drawing/2010/main" xmlns="">
+                    <a14:hiddenFill xmlns="" xmlns:a14="http://schemas.microsoft.com/office/drawing/2010/main">
                       <a:noFill/>
                     </a14:hiddenFill>
                   </a:ext>
@@ -5651,7 +5651,7 @@
                 </a:ln>
                 <a:extLst>
                   <a:ext uri="{909E8E84-426E-40dd-AFC4-6F175D3DCCD1}">
-                    <a14:hiddenFill xmlns:a14="http://schemas.microsoft.com/office/drawing/2010/main" xmlns="">
+                    <a14:hiddenFill xmlns="" xmlns:a14="http://schemas.microsoft.com/office/drawing/2010/main">
                       <a:noFill/>
                     </a14:hiddenFill>
                   </a:ext>
@@ -5692,7 +5692,7 @@
                 </a:ln>
                 <a:extLst>
                   <a:ext uri="{909E8E84-426E-40dd-AFC4-6F175D3DCCD1}">
-                    <a14:hiddenFill xmlns:a14="http://schemas.microsoft.com/office/drawing/2010/main" xmlns="">
+                    <a14:hiddenFill xmlns="" xmlns:a14="http://schemas.microsoft.com/office/drawing/2010/main">
                       <a:noFill/>
                     </a14:hiddenFill>
                   </a:ext>
@@ -5733,7 +5733,7 @@
                 </a:ln>
                 <a:extLst>
                   <a:ext uri="{909E8E84-426E-40dd-AFC4-6F175D3DCCD1}">
-                    <a14:hiddenFill xmlns:a14="http://schemas.microsoft.com/office/drawing/2010/main" xmlns="">
+                    <a14:hiddenFill xmlns="" xmlns:a14="http://schemas.microsoft.com/office/drawing/2010/main">
                       <a:noFill/>
                     </a14:hiddenFill>
                   </a:ext>
@@ -5791,7 +5791,7 @@
                 </a:ln>
                 <a:extLst>
                   <a:ext uri="{909E8E84-426E-40dd-AFC4-6F175D3DCCD1}">
-                    <a14:hiddenFill xmlns:a14="http://schemas.microsoft.com/office/drawing/2010/main" xmlns="">
+                    <a14:hiddenFill xmlns="" xmlns:a14="http://schemas.microsoft.com/office/drawing/2010/main">
                       <a:noFill/>
                     </a14:hiddenFill>
                   </a:ext>
@@ -5832,7 +5832,7 @@
                 </a:ln>
                 <a:extLst>
                   <a:ext uri="{909E8E84-426E-40dd-AFC4-6F175D3DCCD1}">
-                    <a14:hiddenFill xmlns:a14="http://schemas.microsoft.com/office/drawing/2010/main" xmlns="">
+                    <a14:hiddenFill xmlns="" xmlns:a14="http://schemas.microsoft.com/office/drawing/2010/main">
                       <a:noFill/>
                     </a14:hiddenFill>
                   </a:ext>
@@ -5873,7 +5873,7 @@
                 </a:ln>
                 <a:extLst>
                   <a:ext uri="{909E8E84-426E-40dd-AFC4-6F175D3DCCD1}">
-                    <a14:hiddenFill xmlns:a14="http://schemas.microsoft.com/office/drawing/2010/main" xmlns="">
+                    <a14:hiddenFill xmlns="" xmlns:a14="http://schemas.microsoft.com/office/drawing/2010/main">
                       <a:noFill/>
                     </a14:hiddenFill>
                   </a:ext>
@@ -5914,7 +5914,7 @@
                 </a:ln>
                 <a:extLst>
                   <a:ext uri="{909E8E84-426E-40dd-AFC4-6F175D3DCCD1}">
-                    <a14:hiddenFill xmlns:a14="http://schemas.microsoft.com/office/drawing/2010/main" xmlns="">
+                    <a14:hiddenFill xmlns="" xmlns:a14="http://schemas.microsoft.com/office/drawing/2010/main">
                       <a:noFill/>
                     </a14:hiddenFill>
                   </a:ext>
@@ -5955,7 +5955,7 @@
                 </a:ln>
                 <a:extLst>
                   <a:ext uri="{909E8E84-426E-40dd-AFC4-6F175D3DCCD1}">
-                    <a14:hiddenFill xmlns:a14="http://schemas.microsoft.com/office/drawing/2010/main" xmlns="">
+                    <a14:hiddenFill xmlns="" xmlns:a14="http://schemas.microsoft.com/office/drawing/2010/main">
                       <a:noFill/>
                     </a14:hiddenFill>
                   </a:ext>
@@ -5993,14 +5993,14 @@
             </a:ln>
             <a:extLst>
               <a:ext uri="{909E8E84-426E-40dd-AFC4-6F175D3DCCD1}">
-                <a14:hiddenFill xmlns:a14="http://schemas.microsoft.com/office/drawing/2010/main" xmlns="">
+                <a14:hiddenFill xmlns="" xmlns:a14="http://schemas.microsoft.com/office/drawing/2010/main">
                   <a:solidFill>
                     <a:srgbClr val="FFFFFF"/>
                   </a:solidFill>
                 </a14:hiddenFill>
               </a:ext>
               <a:ext uri="{91240B29-F687-4f45-9708-019B960494DF}">
-                <a14:hiddenLine xmlns:a14="http://schemas.microsoft.com/office/drawing/2010/main" xmlns="" w="12700">
+                <a14:hiddenLine xmlns="" xmlns:a14="http://schemas.microsoft.com/office/drawing/2010/main" w="12700">
                   <a:solidFill>
                     <a:srgbClr val="000000"/>
                   </a:solidFill>
@@ -6171,7 +6171,7 @@
             </a:ln>
             <a:extLst>
               <a:ext uri="{909E8E84-426E-40dd-AFC4-6F175D3DCCD1}">
-                <a14:hiddenFill xmlns:a14="http://schemas.microsoft.com/office/drawing/2010/main" xmlns="">
+                <a14:hiddenFill xmlns="" xmlns:a14="http://schemas.microsoft.com/office/drawing/2010/main">
                   <a:noFill/>
                 </a14:hiddenFill>
               </a:ext>
@@ -6252,14 +6252,14 @@
           </a:ln>
           <a:extLst>
             <a:ext uri="{909E8E84-426E-40dd-AFC4-6F175D3DCCD1}">
-              <a14:hiddenFill xmlns:a14="http://schemas.microsoft.com/office/drawing/2010/main" xmlns="">
+              <a14:hiddenFill xmlns="" xmlns:a14="http://schemas.microsoft.com/office/drawing/2010/main">
                 <a:solidFill>
                   <a:srgbClr val="FFFFFF"/>
                 </a:solidFill>
               </a14:hiddenFill>
             </a:ext>
             <a:ext uri="{91240B29-F687-4f45-9708-019B960494DF}">
-              <a14:hiddenLine xmlns:a14="http://schemas.microsoft.com/office/drawing/2010/main" xmlns="" w="9525">
+              <a14:hiddenLine xmlns="" xmlns:a14="http://schemas.microsoft.com/office/drawing/2010/main" w="9525">
                 <a:solidFill>
                   <a:srgbClr val="000000"/>
                 </a:solidFill>
@@ -6293,14 +6293,14 @@
           </a:ln>
           <a:extLst>
             <a:ext uri="{909E8E84-426E-40dd-AFC4-6F175D3DCCD1}">
-              <a14:hiddenFill xmlns:a14="http://schemas.microsoft.com/office/drawing/2010/main" xmlns="">
+              <a14:hiddenFill xmlns="" xmlns:a14="http://schemas.microsoft.com/office/drawing/2010/main">
                 <a:solidFill>
                   <a:srgbClr val="FFFFFF"/>
                 </a:solidFill>
               </a14:hiddenFill>
             </a:ext>
             <a:ext uri="{91240B29-F687-4f45-9708-019B960494DF}">
-              <a14:hiddenLine xmlns:a14="http://schemas.microsoft.com/office/drawing/2010/main" xmlns="" w="12700">
+              <a14:hiddenLine xmlns="" xmlns:a14="http://schemas.microsoft.com/office/drawing/2010/main" w="12700">
                 <a:solidFill>
                   <a:srgbClr val="000000"/>
                 </a:solidFill>

</xml_diff>